<commit_message>
added a few touches to make it look better
</commit_message>
<xml_diff>
--- a/Tuesday.pptx
+++ b/Tuesday.pptx
@@ -111,6 +111,11 @@
       </a:defRPr>
     </a:lvl9pPr>
   </p:defaultTextStyle>
+  <p:extLst>
+    <p:ext uri="{EFAFB233-063F-42B5-8137-9DF3F51BA10A}">
+      <p15:sldGuideLst xmlns:p15="http://schemas.microsoft.com/office/powerpoint/2012/main"/>
+    </p:ext>
+  </p:extLst>
 </p:presentation>
 </file>
 
@@ -6191,7 +6196,7 @@
                 <a:ea typeface="+mj-ea"/>
                 <a:cs typeface="+mj-cs"/>
               </a:rPr>
-              <a:t>STUDENTMANIA</a:t>
+              <a:t>STUDENT-MANIA</a:t>
             </a:r>
           </a:p>
         </p:txBody>
@@ -6415,6 +6420,60 @@
           </a:p>
         </p:txBody>
       </p:sp>
+      <p:pic>
+        <p:nvPicPr>
+          <p:cNvPr id="4" name="Picture 3">
+            <a:extLst>
+              <a:ext uri="{FF2B5EF4-FFF2-40B4-BE49-F238E27FC236}">
+                <a16:creationId xmlns:a16="http://schemas.microsoft.com/office/drawing/2014/main" id="{D9EED3CE-A313-4DAA-9171-FDD4F179E5B3}"/>
+              </a:ext>
+            </a:extLst>
+          </p:cNvPr>
+          <p:cNvPicPr>
+            <a:picLocks noChangeAspect="1"/>
+          </p:cNvPicPr>
+          <p:nvPr/>
+        </p:nvPicPr>
+        <p:blipFill>
+          <a:blip r:embed="rId4"/>
+          <a:stretch>
+            <a:fillRect/>
+          </a:stretch>
+        </p:blipFill>
+        <p:spPr>
+          <a:xfrm>
+            <a:off x="4976029" y="2837934"/>
+            <a:ext cx="838200" cy="733425"/>
+          </a:xfrm>
+          <a:prstGeom prst="roundRect">
+            <a:avLst>
+              <a:gd name="adj" fmla="val 16667"/>
+            </a:avLst>
+          </a:prstGeom>
+          <a:ln>
+            <a:noFill/>
+          </a:ln>
+          <a:effectLst>
+            <a:outerShdw blurRad="152400" dist="12000" dir="900000" sy="98000" kx="110000" ky="200000" algn="tl" rotWithShape="0">
+              <a:srgbClr val="000000">
+                <a:alpha val="30000"/>
+              </a:srgbClr>
+            </a:outerShdw>
+          </a:effectLst>
+          <a:scene3d>
+            <a:camera prst="perspectiveRelaxed">
+              <a:rot lat="19800000" lon="1200000" rev="20820000"/>
+            </a:camera>
+            <a:lightRig rig="threePt" dir="t"/>
+          </a:scene3d>
+          <a:sp3d contourW="6350" prstMaterial="matte">
+            <a:bevelT w="101600" h="101600"/>
+            <a:contourClr>
+              <a:srgbClr val="969696"/>
+            </a:contourClr>
+          </a:sp3d>
+        </p:spPr>
+      </p:pic>
     </p:spTree>
     <p:extLst>
       <p:ext uri="{BB962C8B-B14F-4D97-AF65-F5344CB8AC3E}">
@@ -6459,7 +6518,7 @@
         </p:nvSpPr>
         <p:spPr>
           <a:xfrm>
-            <a:off x="279015" y="1308127"/>
+            <a:off x="696818" y="1557839"/>
             <a:ext cx="4258089" cy="461665"/>
           </a:xfrm>
           <a:prstGeom prst="rect">
@@ -6494,8 +6553,8 @@
         </p:nvSpPr>
         <p:spPr>
           <a:xfrm>
-            <a:off x="279015" y="1743691"/>
-            <a:ext cx="4538230" cy="461665"/>
+            <a:off x="551103" y="3509767"/>
+            <a:ext cx="4549518" cy="830997"/>
           </a:xfrm>
           <a:prstGeom prst="rect">
             <a:avLst/>
@@ -6503,14 +6562,21 @@
           <a:noFill/>
         </p:spPr>
         <p:txBody>
-          <a:bodyPr wrap="none" rtlCol="0">
+          <a:bodyPr wrap="square" rtlCol="0">
             <a:spAutoFit/>
           </a:bodyPr>
           <a:lstStyle/>
           <a:p>
+            <a:pPr algn="ctr"/>
             <a:r>
               <a:rPr lang="en-IE" sz="2400" dirty="0"/>
-              <a:t>S3 BUCKET STORING WEBSITE</a:t>
+              <a:t>S3 </a:t>
+            </a:r>
+          </a:p>
+          <a:p>
+            <a:r>
+              <a:rPr lang="en-IE" sz="2400" dirty="0"/>
+              <a:t> BUCKET STORING WEBSITE</a:t>
             </a:r>
           </a:p>
         </p:txBody>
@@ -6529,8 +6595,8 @@
         </p:nvSpPr>
         <p:spPr>
           <a:xfrm>
-            <a:off x="279015" y="2205356"/>
-            <a:ext cx="1598771" cy="461665"/>
+            <a:off x="1785623" y="4702765"/>
+            <a:ext cx="1784719" cy="461665"/>
           </a:xfrm>
           <a:prstGeom prst="rect">
             <a:avLst/>
@@ -6545,7 +6611,7 @@
           <a:p>
             <a:r>
               <a:rPr lang="en-IE" sz="2400" dirty="0"/>
-              <a:t>ROUTE 53</a:t>
+              <a:t>ROUTE - 53</a:t>
             </a:r>
           </a:p>
         </p:txBody>
@@ -6578,12 +6644,36 @@
         </p:blipFill>
         <p:spPr>
           <a:xfrm>
-            <a:off x="1907837" y="2255188"/>
-            <a:ext cx="2629267" cy="362001"/>
-          </a:xfrm>
-          <a:prstGeom prst="rect">
-            <a:avLst/>
+            <a:off x="1348505" y="5207826"/>
+            <a:ext cx="2557911" cy="362001"/>
+          </a:xfrm>
+          <a:prstGeom prst="roundRect">
+            <a:avLst>
+              <a:gd name="adj" fmla="val 16667"/>
+            </a:avLst>
           </a:prstGeom>
+          <a:ln>
+            <a:noFill/>
+          </a:ln>
+          <a:effectLst>
+            <a:outerShdw blurRad="152400" dist="12000" dir="900000" sy="98000" kx="110000" ky="200000" algn="tl" rotWithShape="0">
+              <a:srgbClr val="000000">
+                <a:alpha val="30000"/>
+              </a:srgbClr>
+            </a:outerShdw>
+          </a:effectLst>
+          <a:scene3d>
+            <a:camera prst="perspectiveRelaxed">
+              <a:rot lat="19800000" lon="1200000" rev="20820000"/>
+            </a:camera>
+            <a:lightRig rig="threePt" dir="t"/>
+          </a:scene3d>
+          <a:sp3d contourW="6350" prstMaterial="matte">
+            <a:bevelT w="101600" h="101600"/>
+            <a:contourClr>
+              <a:srgbClr val="969696"/>
+            </a:contourClr>
+          </a:sp3d>
         </p:spPr>
       </p:pic>
       <p:pic>
@@ -6644,14 +6734,85 @@
         </p:blipFill>
         <p:spPr>
           <a:xfrm>
-            <a:off x="6311503" y="1308127"/>
+            <a:off x="5484189" y="1609992"/>
             <a:ext cx="5601482" cy="4648849"/>
+          </a:xfrm>
+          <a:prstGeom prst="roundRect">
+            <a:avLst>
+              <a:gd name="adj" fmla="val 4167"/>
+            </a:avLst>
+          </a:prstGeom>
+          <a:solidFill>
+            <a:srgbClr val="FFFFFF"/>
+          </a:solidFill>
+          <a:ln w="76200" cap="sq">
+            <a:solidFill>
+              <a:srgbClr val="292929"/>
+            </a:solidFill>
+            <a:miter lim="800000"/>
+          </a:ln>
+          <a:effectLst>
+            <a:reflection blurRad="12700" stA="28000" endPos="28000" dist="5000" dir="5400000" sy="-100000" algn="bl" rotWithShape="0"/>
+          </a:effectLst>
+          <a:scene3d>
+            <a:camera prst="orthographicFront"/>
+            <a:lightRig rig="threePt" dir="t">
+              <a:rot lat="0" lon="0" rev="2700000"/>
+            </a:lightRig>
+          </a:scene3d>
+          <a:sp3d>
+            <a:bevelT h="38100"/>
+            <a:contourClr>
+              <a:srgbClr val="C0C0C0"/>
+            </a:contourClr>
+          </a:sp3d>
+        </p:spPr>
+      </p:pic>
+      <p:sp>
+        <p:nvSpPr>
+          <p:cNvPr id="3" name="TextBox 2">
+            <a:extLst>
+              <a:ext uri="{FF2B5EF4-FFF2-40B4-BE49-F238E27FC236}">
+                <a16:creationId xmlns:a16="http://schemas.microsoft.com/office/drawing/2014/main" id="{C4745215-7843-44F0-8179-95007E5EF856}"/>
+              </a:ext>
+            </a:extLst>
+          </p:cNvPr>
+          <p:cNvSpPr txBox="1"/>
+          <p:nvPr/>
+        </p:nvSpPr>
+        <p:spPr>
+          <a:xfrm>
+            <a:off x="1567543" y="2494690"/>
+            <a:ext cx="2544147" cy="923330"/>
           </a:xfrm>
           <a:prstGeom prst="rect">
             <a:avLst/>
           </a:prstGeom>
-        </p:spPr>
-      </p:pic>
+          <a:noFill/>
+        </p:spPr>
+        <p:txBody>
+          <a:bodyPr wrap="square" rtlCol="0">
+            <a:spAutoFit/>
+          </a:bodyPr>
+          <a:lstStyle/>
+          <a:p>
+            <a:pPr algn="ctr"/>
+            <a:r>
+              <a:rPr lang="en-IE" dirty="0"/>
+              <a:t>EC2 </a:t>
+            </a:r>
+          </a:p>
+          <a:p>
+            <a:r>
+              <a:rPr lang="en-IE" dirty="0"/>
+              <a:t> VIRTUAL MACHINE</a:t>
+            </a:r>
+          </a:p>
+          <a:p>
+            <a:endParaRPr lang="en-GB" dirty="0"/>
+          </a:p>
+        </p:txBody>
+      </p:sp>
     </p:spTree>
     <p:extLst>
       <p:ext uri="{BB962C8B-B14F-4D97-AF65-F5344CB8AC3E}">
@@ -6757,9 +6918,35 @@
             <a:off x="254000" y="1078027"/>
             <a:ext cx="11684000" cy="3949700"/>
           </a:xfrm>
-          <a:prstGeom prst="rect">
-            <a:avLst/>
+          <a:prstGeom prst="roundRect">
+            <a:avLst>
+              <a:gd name="adj" fmla="val 4167"/>
+            </a:avLst>
           </a:prstGeom>
+          <a:solidFill>
+            <a:srgbClr val="FFFFFF"/>
+          </a:solidFill>
+          <a:ln w="76200" cap="sq">
+            <a:solidFill>
+              <a:srgbClr val="292929"/>
+            </a:solidFill>
+            <a:miter lim="800000"/>
+          </a:ln>
+          <a:effectLst>
+            <a:reflection blurRad="12700" stA="28000" endPos="28000" dist="5000" dir="5400000" sy="-100000" algn="bl" rotWithShape="0"/>
+          </a:effectLst>
+          <a:scene3d>
+            <a:camera prst="orthographicFront"/>
+            <a:lightRig rig="threePt" dir="t">
+              <a:rot lat="0" lon="0" rev="2700000"/>
+            </a:lightRig>
+          </a:scene3d>
+          <a:sp3d>
+            <a:bevelT h="38100"/>
+            <a:contourClr>
+              <a:srgbClr val="C0C0C0"/>
+            </a:contourClr>
+          </a:sp3d>
         </p:spPr>
       </p:pic>
       <p:sp>
@@ -6912,9 +7099,35 @@
             <a:off x="3935035" y="1414410"/>
             <a:ext cx="4321925" cy="1424599"/>
           </a:xfrm>
-          <a:prstGeom prst="rect">
-            <a:avLst/>
+          <a:prstGeom prst="roundRect">
+            <a:avLst>
+              <a:gd name="adj" fmla="val 4167"/>
+            </a:avLst>
           </a:prstGeom>
+          <a:solidFill>
+            <a:srgbClr val="FFFFFF"/>
+          </a:solidFill>
+          <a:ln w="76200" cap="sq">
+            <a:solidFill>
+              <a:srgbClr val="292929"/>
+            </a:solidFill>
+            <a:miter lim="800000"/>
+          </a:ln>
+          <a:effectLst>
+            <a:reflection blurRad="12700" stA="28000" endPos="28000" dist="5000" dir="5400000" sy="-100000" algn="bl" rotWithShape="0"/>
+          </a:effectLst>
+          <a:scene3d>
+            <a:camera prst="orthographicFront"/>
+            <a:lightRig rig="threePt" dir="t">
+              <a:rot lat="0" lon="0" rev="2700000"/>
+            </a:lightRig>
+          </a:scene3d>
+          <a:sp3d>
+            <a:bevelT h="38100"/>
+            <a:contourClr>
+              <a:srgbClr val="C0C0C0"/>
+            </a:contourClr>
+          </a:sp3d>
         </p:spPr>
       </p:pic>
       <p:pic>
@@ -6948,9 +7161,35 @@
             <a:off x="922202" y="3062135"/>
             <a:ext cx="10347593" cy="2801069"/>
           </a:xfrm>
-          <a:prstGeom prst="rect">
-            <a:avLst/>
+          <a:prstGeom prst="roundRect">
+            <a:avLst>
+              <a:gd name="adj" fmla="val 4167"/>
+            </a:avLst>
           </a:prstGeom>
+          <a:solidFill>
+            <a:srgbClr val="FFFFFF"/>
+          </a:solidFill>
+          <a:ln w="76200" cap="sq">
+            <a:solidFill>
+              <a:srgbClr val="292929"/>
+            </a:solidFill>
+            <a:miter lim="800000"/>
+          </a:ln>
+          <a:effectLst>
+            <a:reflection blurRad="12700" stA="28000" endPos="28000" dist="5000" dir="5400000" sy="-100000" algn="bl" rotWithShape="0"/>
+          </a:effectLst>
+          <a:scene3d>
+            <a:camera prst="orthographicFront"/>
+            <a:lightRig rig="threePt" dir="t">
+              <a:rot lat="0" lon="0" rev="2700000"/>
+            </a:lightRig>
+          </a:scene3d>
+          <a:sp3d>
+            <a:bevelT h="38100"/>
+            <a:contourClr>
+              <a:srgbClr val="C0C0C0"/>
+            </a:contourClr>
+          </a:sp3d>
         </p:spPr>
       </p:pic>
     </p:spTree>
@@ -7219,9 +7458,35 @@
             <a:off x="3845028" y="859149"/>
             <a:ext cx="8154538" cy="2391109"/>
           </a:xfrm>
-          <a:prstGeom prst="rect">
-            <a:avLst/>
+          <a:prstGeom prst="roundRect">
+            <a:avLst>
+              <a:gd name="adj" fmla="val 4167"/>
+            </a:avLst>
           </a:prstGeom>
+          <a:solidFill>
+            <a:srgbClr val="FFFFFF"/>
+          </a:solidFill>
+          <a:ln w="76200" cap="sq">
+            <a:solidFill>
+              <a:srgbClr val="292929"/>
+            </a:solidFill>
+            <a:miter lim="800000"/>
+          </a:ln>
+          <a:effectLst>
+            <a:reflection blurRad="12700" stA="28000" endPos="28000" dist="5000" dir="5400000" sy="-100000" algn="bl" rotWithShape="0"/>
+          </a:effectLst>
+          <a:scene3d>
+            <a:camera prst="orthographicFront"/>
+            <a:lightRig rig="threePt" dir="t">
+              <a:rot lat="0" lon="0" rev="2700000"/>
+            </a:lightRig>
+          </a:scene3d>
+          <a:sp3d>
+            <a:bevelT h="38100"/>
+            <a:contourClr>
+              <a:srgbClr val="C0C0C0"/>
+            </a:contourClr>
+          </a:sp3d>
         </p:spPr>
       </p:pic>
       <p:pic>
@@ -7252,12 +7517,38 @@
         </p:blipFill>
         <p:spPr>
           <a:xfrm>
-            <a:off x="3845028" y="3385663"/>
+            <a:off x="3782824" y="3458147"/>
             <a:ext cx="8154538" cy="2540704"/>
           </a:xfrm>
-          <a:prstGeom prst="rect">
-            <a:avLst/>
+          <a:prstGeom prst="roundRect">
+            <a:avLst>
+              <a:gd name="adj" fmla="val 4167"/>
+            </a:avLst>
           </a:prstGeom>
+          <a:solidFill>
+            <a:srgbClr val="FFFFFF"/>
+          </a:solidFill>
+          <a:ln w="76200" cap="sq">
+            <a:solidFill>
+              <a:srgbClr val="292929"/>
+            </a:solidFill>
+            <a:miter lim="800000"/>
+          </a:ln>
+          <a:effectLst>
+            <a:reflection blurRad="12700" stA="28000" endPos="28000" dist="5000" dir="5400000" sy="-100000" algn="bl" rotWithShape="0"/>
+          </a:effectLst>
+          <a:scene3d>
+            <a:camera prst="orthographicFront"/>
+            <a:lightRig rig="threePt" dir="t">
+              <a:rot lat="0" lon="0" rev="2700000"/>
+            </a:lightRig>
+          </a:scene3d>
+          <a:sp3d>
+            <a:bevelT h="38100"/>
+            <a:contourClr>
+              <a:srgbClr val="C0C0C0"/>
+            </a:contourClr>
+          </a:sp3d>
         </p:spPr>
       </p:pic>
     </p:spTree>

</xml_diff>

<commit_message>
updated presentation for the presentation friday
</commit_message>
<xml_diff>
--- a/Tuesday.pptx
+++ b/Tuesday.pptx
@@ -201,7 +201,7 @@
           <a:p>
             <a:fld id="{E7427581-7A29-43B7-984D-16F30370E0C1}" type="datetimeFigureOut">
               <a:rPr lang="en-IE" smtClean="0"/>
-              <a:t>14/12/2020</a:t>
+              <a:t>16/12/2020</a:t>
             </a:fld>
             <a:endParaRPr lang="en-IE"/>
           </a:p>
@@ -686,7 +686,7 @@
           <a:p>
             <a:fld id="{1886437B-68F1-444F-869E-E0E5AE251BAE}" type="datetimeFigureOut">
               <a:rPr lang="en-IE" smtClean="0"/>
-              <a:t>14/12/2020</a:t>
+              <a:t>16/12/2020</a:t>
             </a:fld>
             <a:endParaRPr lang="en-IE"/>
           </a:p>
@@ -973,7 +973,7 @@
           <a:p>
             <a:fld id="{1886437B-68F1-444F-869E-E0E5AE251BAE}" type="datetimeFigureOut">
               <a:rPr lang="en-IE" smtClean="0"/>
-              <a:t>14/12/2020</a:t>
+              <a:t>16/12/2020</a:t>
             </a:fld>
             <a:endParaRPr lang="en-IE"/>
           </a:p>
@@ -1165,7 +1165,7 @@
           <a:p>
             <a:fld id="{1886437B-68F1-444F-869E-E0E5AE251BAE}" type="datetimeFigureOut">
               <a:rPr lang="en-IE" smtClean="0"/>
-              <a:t>14/12/2020</a:t>
+              <a:t>16/12/2020</a:t>
             </a:fld>
             <a:endParaRPr lang="en-IE"/>
           </a:p>
@@ -1426,7 +1426,7 @@
           <a:p>
             <a:fld id="{1886437B-68F1-444F-869E-E0E5AE251BAE}" type="datetimeFigureOut">
               <a:rPr lang="en-IE" smtClean="0"/>
-              <a:t>14/12/2020</a:t>
+              <a:t>16/12/2020</a:t>
             </a:fld>
             <a:endParaRPr lang="en-IE"/>
           </a:p>
@@ -1850,7 +1850,7 @@
           <a:p>
             <a:fld id="{1886437B-68F1-444F-869E-E0E5AE251BAE}" type="datetimeFigureOut">
               <a:rPr lang="en-IE" smtClean="0"/>
-              <a:t>14/12/2020</a:t>
+              <a:t>16/12/2020</a:t>
             </a:fld>
             <a:endParaRPr lang="en-IE"/>
           </a:p>
@@ -2396,7 +2396,7 @@
           <a:p>
             <a:fld id="{1886437B-68F1-444F-869E-E0E5AE251BAE}" type="datetimeFigureOut">
               <a:rPr lang="en-IE" smtClean="0"/>
-              <a:t>14/12/2020</a:t>
+              <a:t>16/12/2020</a:t>
             </a:fld>
             <a:endParaRPr lang="en-IE"/>
           </a:p>
@@ -3236,7 +3236,7 @@
           <a:p>
             <a:fld id="{1886437B-68F1-444F-869E-E0E5AE251BAE}" type="datetimeFigureOut">
               <a:rPr lang="en-IE" smtClean="0"/>
-              <a:t>14/12/2020</a:t>
+              <a:t>16/12/2020</a:t>
             </a:fld>
             <a:endParaRPr lang="en-IE"/>
           </a:p>
@@ -3406,7 +3406,7 @@
           <a:p>
             <a:fld id="{1886437B-68F1-444F-869E-E0E5AE251BAE}" type="datetimeFigureOut">
               <a:rPr lang="en-IE" smtClean="0"/>
-              <a:t>14/12/2020</a:t>
+              <a:t>16/12/2020</a:t>
             </a:fld>
             <a:endParaRPr lang="en-IE"/>
           </a:p>
@@ -3590,7 +3590,7 @@
           <a:p>
             <a:fld id="{1886437B-68F1-444F-869E-E0E5AE251BAE}" type="datetimeFigureOut">
               <a:rPr lang="en-IE" smtClean="0"/>
-              <a:t>14/12/2020</a:t>
+              <a:t>16/12/2020</a:t>
             </a:fld>
             <a:endParaRPr lang="en-IE"/>
           </a:p>
@@ -3760,7 +3760,7 @@
           <a:p>
             <a:fld id="{1886437B-68F1-444F-869E-E0E5AE251BAE}" type="datetimeFigureOut">
               <a:rPr lang="en-IE" smtClean="0"/>
-              <a:t>14/12/2020</a:t>
+              <a:t>16/12/2020</a:t>
             </a:fld>
             <a:endParaRPr lang="en-IE"/>
           </a:p>
@@ -4008,7 +4008,7 @@
           <a:p>
             <a:fld id="{1886437B-68F1-444F-869E-E0E5AE251BAE}" type="datetimeFigureOut">
               <a:rPr lang="en-IE" smtClean="0"/>
-              <a:t>14/12/2020</a:t>
+              <a:t>16/12/2020</a:t>
             </a:fld>
             <a:endParaRPr lang="en-IE"/>
           </a:p>
@@ -4245,7 +4245,7 @@
           <a:p>
             <a:fld id="{1886437B-68F1-444F-869E-E0E5AE251BAE}" type="datetimeFigureOut">
               <a:rPr lang="en-IE" smtClean="0"/>
-              <a:t>14/12/2020</a:t>
+              <a:t>16/12/2020</a:t>
             </a:fld>
             <a:endParaRPr lang="en-IE"/>
           </a:p>
@@ -4618,7 +4618,7 @@
           <a:p>
             <a:fld id="{1886437B-68F1-444F-869E-E0E5AE251BAE}" type="datetimeFigureOut">
               <a:rPr lang="en-IE" smtClean="0"/>
-              <a:t>14/12/2020</a:t>
+              <a:t>16/12/2020</a:t>
             </a:fld>
             <a:endParaRPr lang="en-IE"/>
           </a:p>
@@ -4736,7 +4736,7 @@
           <a:p>
             <a:fld id="{1886437B-68F1-444F-869E-E0E5AE251BAE}" type="datetimeFigureOut">
               <a:rPr lang="en-IE" smtClean="0"/>
-              <a:t>14/12/2020</a:t>
+              <a:t>16/12/2020</a:t>
             </a:fld>
             <a:endParaRPr lang="en-IE"/>
           </a:p>
@@ -4831,7 +4831,7 @@
           <a:p>
             <a:fld id="{1886437B-68F1-444F-869E-E0E5AE251BAE}" type="datetimeFigureOut">
               <a:rPr lang="en-IE" smtClean="0"/>
-              <a:t>14/12/2020</a:t>
+              <a:t>16/12/2020</a:t>
             </a:fld>
             <a:endParaRPr lang="en-IE"/>
           </a:p>
@@ -5082,7 +5082,7 @@
           <a:p>
             <a:fld id="{1886437B-68F1-444F-869E-E0E5AE251BAE}" type="datetimeFigureOut">
               <a:rPr lang="en-IE" smtClean="0"/>
-              <a:t>14/12/2020</a:t>
+              <a:t>16/12/2020</a:t>
             </a:fld>
             <a:endParaRPr lang="en-IE"/>
           </a:p>
@@ -5369,7 +5369,7 @@
           <a:p>
             <a:fld id="{1886437B-68F1-444F-869E-E0E5AE251BAE}" type="datetimeFigureOut">
               <a:rPr lang="en-IE" smtClean="0"/>
-              <a:t>14/12/2020</a:t>
+              <a:t>16/12/2020</a:t>
             </a:fld>
             <a:endParaRPr lang="en-IE"/>
           </a:p>
@@ -5582,7 +5582,7 @@
           <a:p>
             <a:fld id="{1886437B-68F1-444F-869E-E0E5AE251BAE}" type="datetimeFigureOut">
               <a:rPr lang="en-IE" smtClean="0"/>
-              <a:t>14/12/2020</a:t>
+              <a:t>16/12/2020</a:t>
             </a:fld>
             <a:endParaRPr lang="en-IE"/>
           </a:p>
@@ -6159,8 +6159,8 @@
         </p:nvSpPr>
         <p:spPr>
           <a:xfrm>
-            <a:off x="407121" y="948809"/>
-            <a:ext cx="4161787" cy="4616450"/>
+            <a:off x="1051669" y="435875"/>
+            <a:ext cx="9902734" cy="1542931"/>
           </a:xfrm>
           <a:prstGeom prst="rect">
             <a:avLst/>
@@ -6184,7 +6184,7 @@
               </a:spcAft>
             </a:pPr>
             <a:r>
-              <a:rPr lang="en-US" sz="3400" b="1" cap="all" dirty="0">
+              <a:rPr lang="en-US" sz="7200" b="1" cap="all" dirty="0">
                 <a:effectLst>
                   <a:outerShdw blurRad="50800" dist="63500" dir="2700000" algn="tl" rotWithShape="0">
                     <a:srgbClr val="000000">
@@ -6267,8 +6267,8 @@
         </p:nvSpPr>
         <p:spPr>
           <a:xfrm>
-            <a:off x="8024029" y="1120775"/>
-            <a:ext cx="6291528" cy="4616450"/>
+            <a:off x="5895542" y="3068690"/>
+            <a:ext cx="7983333" cy="3353435"/>
           </a:xfrm>
           <a:prstGeom prst="rect">
             <a:avLst/>
@@ -6279,6 +6279,28 @@
             <a:normAutofit/>
           </a:bodyPr>
           <a:lstStyle/>
+          <a:p>
+            <a:pPr defTabSz="914400">
+              <a:lnSpc>
+                <a:spcPct val="120000"/>
+              </a:lnSpc>
+              <a:spcAft>
+                <a:spcPts val="600"/>
+              </a:spcAft>
+            </a:pPr>
+            <a:r>
+              <a:rPr lang="en-US" sz="2400" dirty="0">
+                <a:effectLst>
+                  <a:outerShdw blurRad="50800" dist="38100" dir="2700000" algn="tl" rotWithShape="0">
+                    <a:srgbClr val="000000">
+                      <a:alpha val="48000"/>
+                    </a:srgbClr>
+                  </a:outerShdw>
+                </a:effectLst>
+              </a:rPr>
+              <a:t>                      By</a:t>
+            </a:r>
+          </a:p>
           <a:p>
             <a:pPr indent="-228600" defTabSz="914400">
               <a:lnSpc>
@@ -6291,7 +6313,7 @@
               <a:buChar char="•"/>
             </a:pPr>
             <a:r>
-              <a:rPr lang="en-US" dirty="0">
+              <a:rPr lang="en-US" sz="2400" dirty="0">
                 <a:effectLst>
                   <a:outerShdw blurRad="50800" dist="38100" dir="2700000" algn="tl" rotWithShape="0">
                     <a:srgbClr val="000000">
@@ -6300,29 +6322,7 @@
                   </a:outerShdw>
                 </a:effectLst>
               </a:rPr>
-              <a:t>Discord for Students</a:t>
-            </a:r>
-          </a:p>
-          <a:p>
-            <a:pPr defTabSz="914400">
-              <a:lnSpc>
-                <a:spcPct val="120000"/>
-              </a:lnSpc>
-              <a:spcAft>
-                <a:spcPts val="600"/>
-              </a:spcAft>
-            </a:pPr>
-            <a:r>
-              <a:rPr lang="en-US" dirty="0">
-                <a:effectLst>
-                  <a:outerShdw blurRad="50800" dist="38100" dir="2700000" algn="tl" rotWithShape="0">
-                    <a:srgbClr val="000000">
-                      <a:alpha val="48000"/>
-                    </a:srgbClr>
-                  </a:outerShdw>
-                </a:effectLst>
-              </a:rPr>
-              <a:t>	By</a:t>
+              <a:t>Jack Haugh G00359747</a:t>
             </a:r>
           </a:p>
           <a:p>
@@ -6337,7 +6337,7 @@
               <a:buChar char="•"/>
             </a:pPr>
             <a:r>
-              <a:rPr lang="en-US" dirty="0">
+              <a:rPr lang="en-US" sz="2400" dirty="0">
                 <a:effectLst>
                   <a:outerShdw blurRad="50800" dist="38100" dir="2700000" algn="tl" rotWithShape="0">
                     <a:srgbClr val="000000">
@@ -6346,7 +6346,7 @@
                   </a:outerShdw>
                 </a:effectLst>
               </a:rPr>
-              <a:t>Jack Haugh G00359747</a:t>
+              <a:t>Kevin Flanagan G00228079</a:t>
             </a:r>
           </a:p>
           <a:p>
@@ -6361,31 +6361,7 @@
               <a:buChar char="•"/>
             </a:pPr>
             <a:r>
-              <a:rPr lang="en-US" dirty="0">
-                <a:effectLst>
-                  <a:outerShdw blurRad="50800" dist="38100" dir="2700000" algn="tl" rotWithShape="0">
-                    <a:srgbClr val="000000">
-                      <a:alpha val="48000"/>
-                    </a:srgbClr>
-                  </a:outerShdw>
-                </a:effectLst>
-              </a:rPr>
-              <a:t>Kevin Flanagan G00228079</a:t>
-            </a:r>
-          </a:p>
-          <a:p>
-            <a:pPr indent="-228600" defTabSz="914400">
-              <a:lnSpc>
-                <a:spcPct val="120000"/>
-              </a:lnSpc>
-              <a:spcAft>
-                <a:spcPts val="600"/>
-              </a:spcAft>
-              <a:buFont typeface="Arial" panose="020B0604020202020204" pitchFamily="34" charset="0"/>
-              <a:buChar char="•"/>
-            </a:pPr>
-            <a:r>
-              <a:rPr lang="en-US" dirty="0">
+              <a:rPr lang="en-US" sz="2400" dirty="0">
                 <a:effectLst>
                   <a:outerShdw blurRad="50800" dist="38100" dir="2700000" algn="tl" rotWithShape="0">
                     <a:srgbClr val="000000">
@@ -6442,8 +6418,8 @@
         </p:blipFill>
         <p:spPr>
           <a:xfrm>
-            <a:off x="4976029" y="2837934"/>
-            <a:ext cx="838200" cy="733425"/>
+            <a:off x="10202237" y="910254"/>
+            <a:ext cx="656263" cy="574229"/>
           </a:xfrm>
           <a:prstGeom prst="roundRect">
             <a:avLst>
@@ -6472,6 +6448,93 @@
               <a:srgbClr val="969696"/>
             </a:contourClr>
           </a:sp3d>
+        </p:spPr>
+      </p:pic>
+      <p:sp>
+        <p:nvSpPr>
+          <p:cNvPr id="5" name="TextBox 4">
+            <a:extLst>
+              <a:ext uri="{FF2B5EF4-FFF2-40B4-BE49-F238E27FC236}">
+                <a16:creationId xmlns:a16="http://schemas.microsoft.com/office/drawing/2014/main" id="{7165FC83-7BD0-4482-9577-DE52094B4FA9}"/>
+              </a:ext>
+            </a:extLst>
+          </p:cNvPr>
+          <p:cNvSpPr txBox="1"/>
+          <p:nvPr/>
+        </p:nvSpPr>
+        <p:spPr>
+          <a:xfrm>
+            <a:off x="5447552" y="2301359"/>
+            <a:ext cx="5951192" cy="833498"/>
+          </a:xfrm>
+          <a:prstGeom prst="rect">
+            <a:avLst/>
+          </a:prstGeom>
+          <a:noFill/>
+        </p:spPr>
+        <p:txBody>
+          <a:bodyPr wrap="square" rtlCol="0">
+            <a:spAutoFit/>
+          </a:bodyPr>
+          <a:lstStyle/>
+          <a:p>
+            <a:pPr defTabSz="914400">
+              <a:lnSpc>
+                <a:spcPct val="120000"/>
+              </a:lnSpc>
+              <a:spcAft>
+                <a:spcPts val="600"/>
+              </a:spcAft>
+            </a:pPr>
+            <a:r>
+              <a:rPr lang="en-US" sz="4400" u="sng" dirty="0">
+                <a:effectLst>
+                  <a:outerShdw blurRad="50800" dist="38100" dir="2700000" algn="tl" rotWithShape="0">
+                    <a:srgbClr val="000000">
+                      <a:alpha val="48000"/>
+                    </a:srgbClr>
+                  </a:outerShdw>
+                </a:effectLst>
+              </a:rPr>
+              <a:t>Discord for Students</a:t>
+            </a:r>
+          </a:p>
+        </p:txBody>
+      </p:sp>
+      <p:pic>
+        <p:nvPicPr>
+          <p:cNvPr id="7" name="Picture 6">
+            <a:extLst>
+              <a:ext uri="{FF2B5EF4-FFF2-40B4-BE49-F238E27FC236}">
+                <a16:creationId xmlns:a16="http://schemas.microsoft.com/office/drawing/2014/main" id="{96F515D3-DBC8-4540-B784-579008E3618A}"/>
+              </a:ext>
+            </a:extLst>
+          </p:cNvPr>
+          <p:cNvPicPr>
+            <a:picLocks noChangeAspect="1"/>
+          </p:cNvPicPr>
+          <p:nvPr/>
+        </p:nvPicPr>
+        <p:blipFill>
+          <a:blip r:embed="rId5">
+            <a:extLst>
+              <a:ext uri="{28A0092B-C50C-407E-A947-70E740481C1C}">
+                <a14:useLocalDpi xmlns:a14="http://schemas.microsoft.com/office/drawing/2010/main" val="0"/>
+              </a:ext>
+            </a:extLst>
+          </a:blip>
+          <a:stretch>
+            <a:fillRect/>
+          </a:stretch>
+        </p:blipFill>
+        <p:spPr>
+          <a:xfrm>
+            <a:off x="423697" y="2515728"/>
+            <a:ext cx="3833972" cy="2476030"/>
+          </a:xfrm>
+          <a:prstGeom prst="rect">
+            <a:avLst/>
+          </a:prstGeom>
         </p:spPr>
       </p:pic>
     </p:spTree>
@@ -6518,8 +6581,8 @@
         </p:nvSpPr>
         <p:spPr>
           <a:xfrm>
-            <a:off x="696818" y="1557839"/>
-            <a:ext cx="4258089" cy="461665"/>
+            <a:off x="322387" y="1701282"/>
+            <a:ext cx="4936993" cy="523220"/>
           </a:xfrm>
           <a:prstGeom prst="rect">
             <a:avLst/>
@@ -6533,7 +6596,7 @@
           <a:lstStyle/>
           <a:p>
             <a:r>
-              <a:rPr lang="en-IE" sz="2400" dirty="0"/>
+              <a:rPr lang="en-IE" sz="2800" dirty="0"/>
               <a:t>AWS CLOUD WEB SERVICES</a:t>
             </a:r>
           </a:p>
@@ -6553,8 +6616,8 @@
         </p:nvSpPr>
         <p:spPr>
           <a:xfrm>
-            <a:off x="551103" y="3509767"/>
-            <a:ext cx="4549518" cy="830997"/>
+            <a:off x="75096" y="3812110"/>
+            <a:ext cx="5875637" cy="1015663"/>
           </a:xfrm>
           <a:prstGeom prst="rect">
             <a:avLst/>
@@ -6569,13 +6632,13 @@
           <a:p>
             <a:pPr algn="ctr"/>
             <a:r>
-              <a:rPr lang="en-IE" sz="2400" dirty="0"/>
+              <a:rPr lang="en-IE" sz="3000" dirty="0"/>
               <a:t>S3 </a:t>
             </a:r>
           </a:p>
           <a:p>
             <a:r>
-              <a:rPr lang="en-IE" sz="2400" dirty="0"/>
+              <a:rPr lang="en-IE" sz="3000" dirty="0"/>
               <a:t> BUCKET STORING WEBSITE</a:t>
             </a:r>
           </a:p>
@@ -6595,8 +6658,8 @@
         </p:nvSpPr>
         <p:spPr>
           <a:xfrm>
-            <a:off x="1785623" y="4702765"/>
-            <a:ext cx="1784719" cy="461665"/>
+            <a:off x="1826291" y="5202297"/>
+            <a:ext cx="2049792" cy="523220"/>
           </a:xfrm>
           <a:prstGeom prst="rect">
             <a:avLst/>
@@ -6610,7 +6673,7 @@
           <a:lstStyle/>
           <a:p>
             <a:r>
-              <a:rPr lang="en-IE" sz="2400" dirty="0"/>
+              <a:rPr lang="en-IE" sz="2800" dirty="0"/>
               <a:t>ROUTE - 53</a:t>
             </a:r>
           </a:p>
@@ -6644,7 +6707,7 @@
         </p:blipFill>
         <p:spPr>
           <a:xfrm>
-            <a:off x="1348505" y="5207826"/>
+            <a:off x="1445665" y="5738040"/>
             <a:ext cx="2557911" cy="362001"/>
           </a:xfrm>
           <a:prstGeom prst="roundRect">
@@ -6698,7 +6761,7 @@
         </p:blipFill>
         <p:spPr>
           <a:xfrm>
-            <a:off x="2594378" y="569612"/>
+            <a:off x="2512141" y="355738"/>
             <a:ext cx="6992718" cy="969348"/>
           </a:xfrm>
           <a:prstGeom prst="rect">
@@ -6782,8 +6845,8 @@
         </p:nvSpPr>
         <p:spPr>
           <a:xfrm>
-            <a:off x="1567543" y="2494690"/>
-            <a:ext cx="2544147" cy="923330"/>
+            <a:off x="752933" y="2495069"/>
+            <a:ext cx="4327941" cy="1354217"/>
           </a:xfrm>
           <a:prstGeom prst="rect">
             <a:avLst/>
@@ -6798,13 +6861,13 @@
           <a:p>
             <a:pPr algn="ctr"/>
             <a:r>
-              <a:rPr lang="en-IE" dirty="0"/>
+              <a:rPr lang="en-IE" sz="3200" dirty="0"/>
               <a:t>EC2 </a:t>
             </a:r>
           </a:p>
           <a:p>
             <a:r>
-              <a:rPr lang="en-IE" dirty="0"/>
+              <a:rPr lang="en-IE" sz="3200" dirty="0"/>
               <a:t> VIRTUAL MACHINE</a:t>
             </a:r>
           </a:p>
@@ -6835,8 +6898,8 @@
         </p:blipFill>
         <p:spPr>
           <a:xfrm>
-            <a:off x="5895484" y="4515556"/>
-            <a:ext cx="195253" cy="187209"/>
+            <a:off x="5841458" y="4507453"/>
+            <a:ext cx="334084" cy="320320"/>
           </a:xfrm>
           <a:prstGeom prst="rect">
             <a:avLst/>
@@ -7037,8 +7100,8 @@
         </p:nvSpPr>
         <p:spPr>
           <a:xfrm>
-            <a:off x="4249180" y="346030"/>
-            <a:ext cx="3693640" cy="584775"/>
+            <a:off x="4690661" y="207483"/>
+            <a:ext cx="2719014" cy="707886"/>
           </a:xfrm>
           <a:prstGeom prst="rect">
             <a:avLst/>
@@ -7052,7 +7115,7 @@
           <a:lstStyle/>
           <a:p>
             <a:r>
-              <a:rPr lang="en-IE" sz="3200" b="1" dirty="0">
+              <a:rPr lang="en-IE" sz="4000" b="1" dirty="0">
                 <a:effectLst>
                   <a:outerShdw blurRad="38100" dist="38100" dir="2700000" algn="tl">
                     <a:srgbClr val="000000">
@@ -7062,22 +7125,22 @@
                 </a:effectLst>
                 <a:latin typeface="+mj-lt"/>
               </a:rPr>
-              <a:t>ARCHITECTURE</a:t>
+              <a:t>MongoDB</a:t>
             </a:r>
           </a:p>
         </p:txBody>
       </p:sp>
       <p:pic>
         <p:nvPicPr>
-          <p:cNvPr id="4" name="Picture 3" descr="A picture containing chart&#10;&#10;Description automatically generated">
+          <p:cNvPr id="2050" name="Picture 2">
             <a:extLst>
               <a:ext uri="{FF2B5EF4-FFF2-40B4-BE49-F238E27FC236}">
-                <a16:creationId xmlns:a16="http://schemas.microsoft.com/office/drawing/2014/main" id="{6F3DC369-B1B5-4FED-8E2A-B9C088C90AB3}"/>
+                <a16:creationId xmlns:a16="http://schemas.microsoft.com/office/drawing/2014/main" id="{6E243D9A-D3B3-4294-B2BD-568E2434D2B2}"/>
               </a:ext>
             </a:extLst>
           </p:cNvPr>
           <p:cNvPicPr>
-            <a:picLocks noChangeAspect="1"/>
+            <a:picLocks noChangeAspect="1" noChangeArrowheads="1"/>
           </p:cNvPicPr>
           <p:nvPr/>
         </p:nvPicPr>
@@ -7089,14 +7152,15 @@
               </a:ext>
             </a:extLst>
           </a:blip>
+          <a:srcRect/>
           <a:stretch>
             <a:fillRect/>
           </a:stretch>
         </p:blipFill>
-        <p:spPr>
-          <a:xfrm>
-            <a:off x="254000" y="1078027"/>
-            <a:ext cx="11684000" cy="3949700"/>
+        <p:spPr bwMode="auto">
+          <a:xfrm>
+            <a:off x="5409985" y="1157609"/>
+            <a:ext cx="1230315" cy="1292548"/>
           </a:xfrm>
           <a:prstGeom prst="roundRect">
             <a:avLst>
@@ -7108,12 +7172,12 @@
           </a:solidFill>
           <a:ln w="76200" cap="sq">
             <a:solidFill>
-              <a:srgbClr val="292929"/>
+              <a:srgbClr val="EAEAEA"/>
             </a:solidFill>
             <a:miter lim="800000"/>
           </a:ln>
           <a:effectLst>
-            <a:reflection blurRad="12700" stA="28000" endPos="28000" dist="5000" dir="5400000" sy="-100000" algn="bl" rotWithShape="0"/>
+            <a:reflection blurRad="12700" stA="33000" endPos="28000" dist="5000" dir="5400000" sy="-100000" algn="bl" rotWithShape="0"/>
           </a:effectLst>
           <a:scene3d>
             <a:camera prst="orthographicFront"/>
@@ -7121,20 +7185,173 @@
               <a:rot lat="0" lon="0" rev="2700000"/>
             </a:lightRig>
           </a:scene3d>
-          <a:sp3d>
+          <a:sp3d contourW="6350">
             <a:bevelT h="38100"/>
             <a:contourClr>
               <a:srgbClr val="C0C0C0"/>
             </a:contourClr>
           </a:sp3d>
+          <a:extLst>
+            <a:ext uri="{909E8E84-426E-40DD-AFC4-6F175D3DCCD1}">
+              <a14:hiddenFill xmlns:a14="http://schemas.microsoft.com/office/drawing/2010/main">
+                <a:solidFill>
+                  <a:srgbClr val="FFFFFF"/>
+                </a:solidFill>
+              </a14:hiddenFill>
+            </a:ext>
+          </a:extLst>
         </p:spPr>
       </p:pic>
-      <p:sp>
-        <p:nvSpPr>
-          <p:cNvPr id="5" name="TextBox 4">
+      <p:pic>
+        <p:nvPicPr>
+          <p:cNvPr id="2052" name="Picture 4">
             <a:extLst>
               <a:ext uri="{FF2B5EF4-FFF2-40B4-BE49-F238E27FC236}">
-                <a16:creationId xmlns:a16="http://schemas.microsoft.com/office/drawing/2014/main" id="{253AD0AA-0FDB-40DB-909E-A53A39EA0BB2}"/>
+                <a16:creationId xmlns:a16="http://schemas.microsoft.com/office/drawing/2014/main" id="{75BF566B-8D35-46B7-9B12-109F2FA7639D}"/>
+              </a:ext>
+            </a:extLst>
+          </p:cNvPr>
+          <p:cNvPicPr>
+            <a:picLocks noChangeAspect="1" noChangeArrowheads="1"/>
+          </p:cNvPicPr>
+          <p:nvPr/>
+        </p:nvPicPr>
+        <p:blipFill>
+          <a:blip r:embed="rId3">
+            <a:extLst>
+              <a:ext uri="{28A0092B-C50C-407E-A947-70E740481C1C}">
+                <a14:useLocalDpi xmlns:a14="http://schemas.microsoft.com/office/drawing/2010/main" val="0"/>
+              </a:ext>
+            </a:extLst>
+          </a:blip>
+          <a:srcRect/>
+          <a:stretch>
+            <a:fillRect/>
+          </a:stretch>
+        </p:blipFill>
+        <p:spPr bwMode="auto">
+          <a:xfrm>
+            <a:off x="8730824" y="4438719"/>
+            <a:ext cx="1437823" cy="1430197"/>
+          </a:xfrm>
+          <a:prstGeom prst="roundRect">
+            <a:avLst>
+              <a:gd name="adj" fmla="val 4167"/>
+            </a:avLst>
+          </a:prstGeom>
+          <a:solidFill>
+            <a:srgbClr val="FFFFFF"/>
+          </a:solidFill>
+          <a:ln w="76200" cap="sq">
+            <a:solidFill>
+              <a:srgbClr val="EAEAEA"/>
+            </a:solidFill>
+            <a:miter lim="800000"/>
+          </a:ln>
+          <a:effectLst>
+            <a:reflection blurRad="12700" stA="33000" endPos="28000" dist="5000" dir="5400000" sy="-100000" algn="bl" rotWithShape="0"/>
+          </a:effectLst>
+          <a:scene3d>
+            <a:camera prst="orthographicFront"/>
+            <a:lightRig rig="threePt" dir="t">
+              <a:rot lat="0" lon="0" rev="2700000"/>
+            </a:lightRig>
+          </a:scene3d>
+          <a:sp3d contourW="6350">
+            <a:bevelT h="38100"/>
+            <a:contourClr>
+              <a:srgbClr val="C0C0C0"/>
+            </a:contourClr>
+          </a:sp3d>
+          <a:extLst>
+            <a:ext uri="{909E8E84-426E-40DD-AFC4-6F175D3DCCD1}">
+              <a14:hiddenFill xmlns:a14="http://schemas.microsoft.com/office/drawing/2010/main">
+                <a:solidFill>
+                  <a:srgbClr val="FFFFFF"/>
+                </a:solidFill>
+              </a14:hiddenFill>
+            </a:ext>
+          </a:extLst>
+        </p:spPr>
+      </p:pic>
+      <p:pic>
+        <p:nvPicPr>
+          <p:cNvPr id="2054" name="Picture 6">
+            <a:extLst>
+              <a:ext uri="{FF2B5EF4-FFF2-40B4-BE49-F238E27FC236}">
+                <a16:creationId xmlns:a16="http://schemas.microsoft.com/office/drawing/2014/main" id="{866EBEF9-D710-47A8-8F80-EBC96420E029}"/>
+              </a:ext>
+            </a:extLst>
+          </p:cNvPr>
+          <p:cNvPicPr>
+            <a:picLocks noChangeAspect="1" noChangeArrowheads="1"/>
+          </p:cNvPicPr>
+          <p:nvPr/>
+        </p:nvPicPr>
+        <p:blipFill>
+          <a:blip r:embed="rId4">
+            <a:extLst>
+              <a:ext uri="{28A0092B-C50C-407E-A947-70E740481C1C}">
+                <a14:useLocalDpi xmlns:a14="http://schemas.microsoft.com/office/drawing/2010/main" val="0"/>
+              </a:ext>
+            </a:extLst>
+          </a:blip>
+          <a:srcRect/>
+          <a:stretch>
+            <a:fillRect/>
+          </a:stretch>
+        </p:blipFill>
+        <p:spPr bwMode="auto">
+          <a:xfrm>
+            <a:off x="1809305" y="4477124"/>
+            <a:ext cx="1949805" cy="1430197"/>
+          </a:xfrm>
+          <a:prstGeom prst="roundRect">
+            <a:avLst>
+              <a:gd name="adj" fmla="val 4167"/>
+            </a:avLst>
+          </a:prstGeom>
+          <a:solidFill>
+            <a:srgbClr val="FFFFFF"/>
+          </a:solidFill>
+          <a:ln w="76200" cap="sq">
+            <a:solidFill>
+              <a:srgbClr val="EAEAEA"/>
+            </a:solidFill>
+            <a:miter lim="800000"/>
+          </a:ln>
+          <a:effectLst>
+            <a:reflection blurRad="12700" stA="33000" endPos="28000" dist="5000" dir="5400000" sy="-100000" algn="bl" rotWithShape="0"/>
+          </a:effectLst>
+          <a:scene3d>
+            <a:camera prst="orthographicFront"/>
+            <a:lightRig rig="threePt" dir="t">
+              <a:rot lat="0" lon="0" rev="2700000"/>
+            </a:lightRig>
+          </a:scene3d>
+          <a:sp3d contourW="6350">
+            <a:bevelT h="38100"/>
+            <a:contourClr>
+              <a:srgbClr val="C0C0C0"/>
+            </a:contourClr>
+          </a:sp3d>
+          <a:extLst>
+            <a:ext uri="{909E8E84-426E-40DD-AFC4-6F175D3DCCD1}">
+              <a14:hiddenFill xmlns:a14="http://schemas.microsoft.com/office/drawing/2010/main">
+                <a:solidFill>
+                  <a:srgbClr val="FFFFFF"/>
+                </a:solidFill>
+              </a14:hiddenFill>
+            </a:ext>
+          </a:extLst>
+        </p:spPr>
+      </p:pic>
+      <p:sp>
+        <p:nvSpPr>
+          <p:cNvPr id="7" name="TextBox 6">
+            <a:extLst>
+              <a:ext uri="{FF2B5EF4-FFF2-40B4-BE49-F238E27FC236}">
+                <a16:creationId xmlns:a16="http://schemas.microsoft.com/office/drawing/2014/main" id="{FBBF9762-0B55-4A16-ABF2-377A11E538DA}"/>
               </a:ext>
             </a:extLst>
           </p:cNvPr>
@@ -7143,8 +7360,8 @@
         </p:nvSpPr>
         <p:spPr>
           <a:xfrm>
-            <a:off x="4349368" y="5174949"/>
-            <a:ext cx="3493264" cy="461665"/>
+            <a:off x="5078601" y="3347637"/>
+            <a:ext cx="2532691" cy="584775"/>
           </a:xfrm>
           <a:prstGeom prst="rect">
             <a:avLst/>
@@ -7152,16 +7369,420 @@
           <a:noFill/>
         </p:spPr>
         <p:txBody>
-          <a:bodyPr wrap="none" rtlCol="0">
+          <a:bodyPr wrap="square" rtlCol="0">
             <a:spAutoFit/>
           </a:bodyPr>
           <a:lstStyle/>
           <a:p>
             <a:r>
-              <a:rPr lang="en-IE" sz="2400" b="1" dirty="0">
-                <a:latin typeface="+mj-lt"/>
-              </a:rPr>
-              <a:t>CREATE A CLUSTER</a:t>
+              <a:rPr lang="en-GB" sz="3200" dirty="0"/>
+              <a:t>Flexibility</a:t>
+            </a:r>
+          </a:p>
+        </p:txBody>
+      </p:sp>
+      <p:sp>
+        <p:nvSpPr>
+          <p:cNvPr id="8" name="TextBox 7">
+            <a:extLst>
+              <a:ext uri="{FF2B5EF4-FFF2-40B4-BE49-F238E27FC236}">
+                <a16:creationId xmlns:a16="http://schemas.microsoft.com/office/drawing/2014/main" id="{34F1538C-A4C8-4326-B437-9548B1579E58}"/>
+              </a:ext>
+            </a:extLst>
+          </p:cNvPr>
+          <p:cNvSpPr txBox="1"/>
+          <p:nvPr/>
+        </p:nvSpPr>
+        <p:spPr>
+          <a:xfrm>
+            <a:off x="2035398" y="2624361"/>
+            <a:ext cx="3113452" cy="1015663"/>
+          </a:xfrm>
+          <a:prstGeom prst="rect">
+            <a:avLst/>
+          </a:prstGeom>
+          <a:noFill/>
+        </p:spPr>
+        <p:txBody>
+          <a:bodyPr wrap="square" rtlCol="0">
+            <a:spAutoFit/>
+          </a:bodyPr>
+          <a:lstStyle/>
+          <a:p>
+            <a:r>
+              <a:rPr lang="en-GB" sz="3000" dirty="0"/>
+              <a:t>Scalability &amp; Performance</a:t>
+            </a:r>
+          </a:p>
+        </p:txBody>
+      </p:sp>
+      <p:sp>
+        <p:nvSpPr>
+          <p:cNvPr id="9" name="TextBox 8">
+            <a:extLst>
+              <a:ext uri="{FF2B5EF4-FFF2-40B4-BE49-F238E27FC236}">
+                <a16:creationId xmlns:a16="http://schemas.microsoft.com/office/drawing/2014/main" id="{E9112D83-B233-400A-B6E6-ACA28D0ED060}"/>
+              </a:ext>
+            </a:extLst>
+          </p:cNvPr>
+          <p:cNvSpPr txBox="1"/>
+          <p:nvPr/>
+        </p:nvSpPr>
+        <p:spPr>
+          <a:xfrm>
+            <a:off x="7765767" y="2624361"/>
+            <a:ext cx="3113452" cy="954107"/>
+          </a:xfrm>
+          <a:prstGeom prst="rect">
+            <a:avLst/>
+          </a:prstGeom>
+          <a:noFill/>
+        </p:spPr>
+        <p:txBody>
+          <a:bodyPr wrap="square" rtlCol="0">
+            <a:spAutoFit/>
+          </a:bodyPr>
+          <a:lstStyle/>
+          <a:p>
+            <a:r>
+              <a:rPr lang="en-GB" sz="2800" dirty="0"/>
+              <a:t>Strong Consistency</a:t>
+            </a:r>
+          </a:p>
+        </p:txBody>
+      </p:sp>
+      <p:sp>
+        <p:nvSpPr>
+          <p:cNvPr id="10" name="TextBox 9">
+            <a:extLst>
+              <a:ext uri="{FF2B5EF4-FFF2-40B4-BE49-F238E27FC236}">
+                <a16:creationId xmlns:a16="http://schemas.microsoft.com/office/drawing/2014/main" id="{BD395641-ACDC-4D50-B36E-531EEDBCAF06}"/>
+              </a:ext>
+            </a:extLst>
+          </p:cNvPr>
+          <p:cNvSpPr txBox="1"/>
+          <p:nvPr/>
+        </p:nvSpPr>
+        <p:spPr>
+          <a:xfrm>
+            <a:off x="9050202" y="5868916"/>
+            <a:ext cx="1385738" cy="378948"/>
+          </a:xfrm>
+          <a:prstGeom prst="rect">
+            <a:avLst/>
+          </a:prstGeom>
+          <a:noFill/>
+        </p:spPr>
+        <p:txBody>
+          <a:bodyPr wrap="square" rtlCol="0">
+            <a:spAutoFit/>
+          </a:bodyPr>
+          <a:lstStyle/>
+          <a:p>
+            <a:r>
+              <a:rPr lang="en-GB" dirty="0"/>
+              <a:t>Stack</a:t>
+            </a:r>
+          </a:p>
+        </p:txBody>
+      </p:sp>
+      <p:sp>
+        <p:nvSpPr>
+          <p:cNvPr id="11" name="TextBox 10">
+            <a:extLst>
+              <a:ext uri="{FF2B5EF4-FFF2-40B4-BE49-F238E27FC236}">
+                <a16:creationId xmlns:a16="http://schemas.microsoft.com/office/drawing/2014/main" id="{D372B222-2424-4DEA-AF54-F868941509FC}"/>
+              </a:ext>
+            </a:extLst>
+          </p:cNvPr>
+          <p:cNvSpPr txBox="1"/>
+          <p:nvPr/>
+        </p:nvSpPr>
+        <p:spPr>
+          <a:xfrm>
+            <a:off x="5409985" y="2450157"/>
+            <a:ext cx="1280367" cy="369332"/>
+          </a:xfrm>
+          <a:prstGeom prst="rect">
+            <a:avLst/>
+          </a:prstGeom>
+          <a:noFill/>
+        </p:spPr>
+        <p:txBody>
+          <a:bodyPr wrap="square" rtlCol="0">
+            <a:spAutoFit/>
+          </a:bodyPr>
+          <a:lstStyle/>
+          <a:p>
+            <a:r>
+              <a:rPr lang="en-GB" dirty="0"/>
+              <a:t>MongoDB</a:t>
+            </a:r>
+          </a:p>
+        </p:txBody>
+      </p:sp>
+      <p:sp>
+        <p:nvSpPr>
+          <p:cNvPr id="13" name="TextBox 12">
+            <a:extLst>
+              <a:ext uri="{FF2B5EF4-FFF2-40B4-BE49-F238E27FC236}">
+                <a16:creationId xmlns:a16="http://schemas.microsoft.com/office/drawing/2014/main" id="{A4205A80-E67E-4C9C-8C12-3D7DCD914DB4}"/>
+              </a:ext>
+            </a:extLst>
+          </p:cNvPr>
+          <p:cNvSpPr txBox="1"/>
+          <p:nvPr/>
+        </p:nvSpPr>
+        <p:spPr>
+          <a:xfrm>
+            <a:off x="2534016" y="5868916"/>
+            <a:ext cx="1385738" cy="378948"/>
+          </a:xfrm>
+          <a:prstGeom prst="rect">
+            <a:avLst/>
+          </a:prstGeom>
+          <a:noFill/>
+        </p:spPr>
+        <p:txBody>
+          <a:bodyPr wrap="square" rtlCol="0">
+            <a:spAutoFit/>
+          </a:bodyPr>
+          <a:lstStyle/>
+          <a:p>
+            <a:r>
+              <a:rPr lang="en-GB" dirty="0"/>
+              <a:t>Lyft</a:t>
+            </a:r>
+          </a:p>
+        </p:txBody>
+      </p:sp>
+      <p:cxnSp>
+        <p:nvCxnSpPr>
+          <p:cNvPr id="15" name="Straight Arrow Connector 14">
+            <a:extLst>
+              <a:ext uri="{FF2B5EF4-FFF2-40B4-BE49-F238E27FC236}">
+                <a16:creationId xmlns:a16="http://schemas.microsoft.com/office/drawing/2014/main" id="{BCBFB452-CDAD-4C37-BBDD-77C2139008FA}"/>
+              </a:ext>
+            </a:extLst>
+          </p:cNvPr>
+          <p:cNvCxnSpPr/>
+          <p:nvPr/>
+        </p:nvCxnSpPr>
+        <p:spPr>
+          <a:xfrm flipV="1">
+            <a:off x="4475405" y="2367064"/>
+            <a:ext cx="712680" cy="386168"/>
+          </a:xfrm>
+          <a:prstGeom prst="straightConnector1">
+            <a:avLst/>
+          </a:prstGeom>
+          <a:ln>
+            <a:headEnd type="triangle"/>
+            <a:tailEnd type="triangle"/>
+          </a:ln>
+        </p:spPr>
+        <p:style>
+          <a:lnRef idx="1">
+            <a:schemeClr val="accent1"/>
+          </a:lnRef>
+          <a:fillRef idx="0">
+            <a:schemeClr val="accent1"/>
+          </a:fillRef>
+          <a:effectRef idx="0">
+            <a:schemeClr val="accent1"/>
+          </a:effectRef>
+          <a:fontRef idx="minor">
+            <a:schemeClr val="tx1"/>
+          </a:fontRef>
+        </p:style>
+      </p:cxnSp>
+      <p:cxnSp>
+        <p:nvCxnSpPr>
+          <p:cNvPr id="19" name="Straight Arrow Connector 18">
+            <a:extLst>
+              <a:ext uri="{FF2B5EF4-FFF2-40B4-BE49-F238E27FC236}">
+                <a16:creationId xmlns:a16="http://schemas.microsoft.com/office/drawing/2014/main" id="{BB61AD74-F472-44EC-9C6D-3F84CAC65C1A}"/>
+              </a:ext>
+            </a:extLst>
+          </p:cNvPr>
+          <p:cNvCxnSpPr>
+            <a:cxnSpLocks/>
+          </p:cNvCxnSpPr>
+          <p:nvPr/>
+        </p:nvCxnSpPr>
+        <p:spPr>
+          <a:xfrm>
+            <a:off x="6872772" y="2374641"/>
+            <a:ext cx="660523" cy="371013"/>
+          </a:xfrm>
+          <a:prstGeom prst="straightConnector1">
+            <a:avLst/>
+          </a:prstGeom>
+          <a:ln>
+            <a:headEnd type="triangle"/>
+            <a:tailEnd type="triangle"/>
+          </a:ln>
+        </p:spPr>
+        <p:style>
+          <a:lnRef idx="1">
+            <a:schemeClr val="accent1"/>
+          </a:lnRef>
+          <a:fillRef idx="0">
+            <a:schemeClr val="accent1"/>
+          </a:fillRef>
+          <a:effectRef idx="0">
+            <a:schemeClr val="accent1"/>
+          </a:effectRef>
+          <a:fontRef idx="minor">
+            <a:schemeClr val="tx1"/>
+          </a:fontRef>
+        </p:style>
+      </p:cxnSp>
+      <p:cxnSp>
+        <p:nvCxnSpPr>
+          <p:cNvPr id="18" name="Straight Arrow Connector 17">
+            <a:extLst>
+              <a:ext uri="{FF2B5EF4-FFF2-40B4-BE49-F238E27FC236}">
+                <a16:creationId xmlns:a16="http://schemas.microsoft.com/office/drawing/2014/main" id="{1FAF886E-DF41-405C-A44D-7DCEB26FB679}"/>
+              </a:ext>
+            </a:extLst>
+          </p:cNvPr>
+          <p:cNvCxnSpPr>
+            <a:cxnSpLocks/>
+          </p:cNvCxnSpPr>
+          <p:nvPr/>
+        </p:nvCxnSpPr>
+        <p:spPr>
+          <a:xfrm>
+            <a:off x="5999542" y="2843481"/>
+            <a:ext cx="0" cy="598346"/>
+          </a:xfrm>
+          <a:prstGeom prst="straightConnector1">
+            <a:avLst/>
+          </a:prstGeom>
+          <a:ln>
+            <a:headEnd type="triangle"/>
+            <a:tailEnd type="triangle"/>
+          </a:ln>
+        </p:spPr>
+        <p:style>
+          <a:lnRef idx="1">
+            <a:schemeClr val="accent1"/>
+          </a:lnRef>
+          <a:fillRef idx="0">
+            <a:schemeClr val="accent1"/>
+          </a:fillRef>
+          <a:effectRef idx="0">
+            <a:schemeClr val="accent1"/>
+          </a:effectRef>
+          <a:fontRef idx="minor">
+            <a:schemeClr val="tx1"/>
+          </a:fontRef>
+        </p:style>
+      </p:cxnSp>
+      <p:pic>
+        <p:nvPicPr>
+          <p:cNvPr id="2056" name="Picture 8">
+            <a:extLst>
+              <a:ext uri="{FF2B5EF4-FFF2-40B4-BE49-F238E27FC236}">
+                <a16:creationId xmlns:a16="http://schemas.microsoft.com/office/drawing/2014/main" id="{9F3C7E9C-5AF8-4B53-8879-EB41C210CB93}"/>
+              </a:ext>
+            </a:extLst>
+          </p:cNvPr>
+          <p:cNvPicPr>
+            <a:picLocks noChangeAspect="1" noChangeArrowheads="1"/>
+          </p:cNvPicPr>
+          <p:nvPr/>
+        </p:nvPicPr>
+        <p:blipFill>
+          <a:blip r:embed="rId5">
+            <a:extLst>
+              <a:ext uri="{28A0092B-C50C-407E-A947-70E740481C1C}">
+                <a14:useLocalDpi xmlns:a14="http://schemas.microsoft.com/office/drawing/2010/main" val="0"/>
+              </a:ext>
+            </a:extLst>
+          </a:blip>
+          <a:srcRect/>
+          <a:stretch>
+            <a:fillRect/>
+          </a:stretch>
+        </p:blipFill>
+        <p:spPr bwMode="auto">
+          <a:xfrm>
+            <a:off x="5033913" y="4438719"/>
+            <a:ext cx="2407247" cy="1507008"/>
+          </a:xfrm>
+          <a:prstGeom prst="roundRect">
+            <a:avLst>
+              <a:gd name="adj" fmla="val 4167"/>
+            </a:avLst>
+          </a:prstGeom>
+          <a:solidFill>
+            <a:srgbClr val="FFFFFF"/>
+          </a:solidFill>
+          <a:ln w="76200" cap="sq">
+            <a:solidFill>
+              <a:srgbClr val="EAEAEA"/>
+            </a:solidFill>
+            <a:miter lim="800000"/>
+          </a:ln>
+          <a:effectLst>
+            <a:reflection blurRad="12700" stA="33000" endPos="28000" dist="5000" dir="5400000" sy="-100000" algn="bl" rotWithShape="0"/>
+          </a:effectLst>
+          <a:scene3d>
+            <a:camera prst="orthographicFront"/>
+            <a:lightRig rig="threePt" dir="t">
+              <a:rot lat="0" lon="0" rev="2700000"/>
+            </a:lightRig>
+          </a:scene3d>
+          <a:sp3d contourW="6350">
+            <a:bevelT h="38100"/>
+            <a:contourClr>
+              <a:srgbClr val="C0C0C0"/>
+            </a:contourClr>
+          </a:sp3d>
+          <a:extLst>
+            <a:ext uri="{909E8E84-426E-40DD-AFC4-6F175D3DCCD1}">
+              <a14:hiddenFill xmlns:a14="http://schemas.microsoft.com/office/drawing/2010/main">
+                <a:solidFill>
+                  <a:srgbClr val="FFFFFF"/>
+                </a:solidFill>
+              </a14:hiddenFill>
+            </a:ext>
+          </a:extLst>
+        </p:spPr>
+      </p:pic>
+      <p:sp>
+        <p:nvSpPr>
+          <p:cNvPr id="21" name="TextBox 20">
+            <a:extLst>
+              <a:ext uri="{FF2B5EF4-FFF2-40B4-BE49-F238E27FC236}">
+                <a16:creationId xmlns:a16="http://schemas.microsoft.com/office/drawing/2014/main" id="{8F346F46-2A4F-4372-9A9C-A62E01893102}"/>
+              </a:ext>
+            </a:extLst>
+          </p:cNvPr>
+          <p:cNvSpPr txBox="1"/>
+          <p:nvPr/>
+        </p:nvSpPr>
+        <p:spPr>
+          <a:xfrm>
+            <a:off x="5849566" y="5942631"/>
+            <a:ext cx="972317" cy="369332"/>
+          </a:xfrm>
+          <a:prstGeom prst="rect">
+            <a:avLst/>
+          </a:prstGeom>
+          <a:noFill/>
+        </p:spPr>
+        <p:txBody>
+          <a:bodyPr wrap="square" rtlCol="0">
+            <a:spAutoFit/>
+          </a:bodyPr>
+          <a:lstStyle/>
+          <a:p>
+            <a:r>
+              <a:rPr lang="en-GB" dirty="0"/>
+              <a:t>Twitter</a:t>
             </a:r>
           </a:p>
         </p:txBody>
@@ -7312,10 +7933,10 @@
       </p:pic>
       <p:pic>
         <p:nvPicPr>
-          <p:cNvPr id="7" name="Picture 6" descr="A screenshot of a person&#10;&#10;Description automatically generated">
+          <p:cNvPr id="2" name="Picture 1">
             <a:extLst>
               <a:ext uri="{FF2B5EF4-FFF2-40B4-BE49-F238E27FC236}">
-                <a16:creationId xmlns:a16="http://schemas.microsoft.com/office/drawing/2014/main" id="{0405411B-692B-4703-B793-8865F9594795}"/>
+                <a16:creationId xmlns:a16="http://schemas.microsoft.com/office/drawing/2014/main" id="{D7D3AED7-F8FD-4573-85A0-785B911F81C4}"/>
               </a:ext>
             </a:extLst>
           </p:cNvPr>
@@ -7325,21 +7946,15 @@
           <p:nvPr/>
         </p:nvPicPr>
         <p:blipFill>
-          <a:blip r:embed="rId3">
-            <a:extLst>
-              <a:ext uri="{28A0092B-C50C-407E-A947-70E740481C1C}">
-                <a14:useLocalDpi xmlns:a14="http://schemas.microsoft.com/office/drawing/2010/main" val="0"/>
-              </a:ext>
-            </a:extLst>
-          </a:blip>
+          <a:blip r:embed="rId3"/>
           <a:stretch>
             <a:fillRect/>
           </a:stretch>
         </p:blipFill>
         <p:spPr>
           <a:xfrm>
-            <a:off x="922202" y="3062135"/>
-            <a:ext cx="10347593" cy="2801069"/>
+            <a:off x="1029283" y="3119420"/>
+            <a:ext cx="10012172" cy="2600688"/>
           </a:xfrm>
           <a:prstGeom prst="roundRect">
             <a:avLst>
@@ -7416,8 +8031,8 @@
         </p:nvSpPr>
         <p:spPr>
           <a:xfrm>
-            <a:off x="735106" y="271112"/>
-            <a:ext cx="3780450" cy="461665"/>
+            <a:off x="325655" y="156446"/>
+            <a:ext cx="5500802" cy="584775"/>
           </a:xfrm>
           <a:prstGeom prst="rect">
             <a:avLst/>
@@ -7431,134 +8046,9 @@
           <a:lstStyle/>
           <a:p>
             <a:r>
-              <a:rPr lang="en-IE" sz="2400" dirty="0"/>
+              <a:rPr lang="en-IE" sz="3200" dirty="0"/>
               <a:t>Semester 2 /Future Goals</a:t>
             </a:r>
-          </a:p>
-        </p:txBody>
-      </p:sp>
-      <p:sp>
-        <p:nvSpPr>
-          <p:cNvPr id="3" name="TextBox 2">
-            <a:extLst>
-              <a:ext uri="{FF2B5EF4-FFF2-40B4-BE49-F238E27FC236}">
-                <a16:creationId xmlns:a16="http://schemas.microsoft.com/office/drawing/2014/main" id="{E1DE96B5-7B66-4454-B6A7-EEAAF0440E0F}"/>
-              </a:ext>
-            </a:extLst>
-          </p:cNvPr>
-          <p:cNvSpPr txBox="1"/>
-          <p:nvPr/>
-        </p:nvSpPr>
-        <p:spPr>
-          <a:xfrm>
-            <a:off x="735106" y="1125053"/>
-            <a:ext cx="2956361" cy="4801314"/>
-          </a:xfrm>
-          <a:prstGeom prst="rect">
-            <a:avLst/>
-          </a:prstGeom>
-          <a:noFill/>
-        </p:spPr>
-        <p:txBody>
-          <a:bodyPr wrap="square" rtlCol="0">
-            <a:spAutoFit/>
-          </a:bodyPr>
-          <a:lstStyle/>
-          <a:p>
-            <a:pPr marL="285750" indent="-285750">
-              <a:buFont typeface="Arial" panose="020B0604020202020204" pitchFamily="34" charset="0"/>
-              <a:buChar char="•"/>
-            </a:pPr>
-            <a:r>
-              <a:rPr lang="en-IE" b="1" u="sng" dirty="0">
-                <a:solidFill>
-                  <a:srgbClr val="FF0000"/>
-                </a:solidFill>
-              </a:rPr>
-              <a:t>Login</a:t>
-            </a:r>
-            <a:r>
-              <a:rPr lang="en-IE" dirty="0"/>
-              <a:t> – </a:t>
-            </a:r>
-            <a:r>
-              <a:rPr lang="en-IE" i="1" dirty="0"/>
-              <a:t>functioning login</a:t>
-            </a:r>
-          </a:p>
-          <a:p>
-            <a:endParaRPr lang="en-IE" i="1" dirty="0"/>
-          </a:p>
-          <a:p>
-            <a:pPr marL="285750" indent="-285750">
-              <a:buFont typeface="Arial" panose="020B0604020202020204" pitchFamily="34" charset="0"/>
-              <a:buChar char="•"/>
-            </a:pPr>
-            <a:r>
-              <a:rPr lang="en-IE" b="1" u="sng" dirty="0">
-                <a:solidFill>
-                  <a:srgbClr val="FF0000"/>
-                </a:solidFill>
-              </a:rPr>
-              <a:t>Modules for student </a:t>
-            </a:r>
-            <a:r>
-              <a:rPr lang="en-IE" dirty="0"/>
-              <a:t>– </a:t>
-            </a:r>
-            <a:r>
-              <a:rPr lang="en-IE" i="1" dirty="0"/>
-              <a:t>students having there own section for each of there modules</a:t>
-            </a:r>
-          </a:p>
-          <a:p>
-            <a:endParaRPr lang="en-IE" i="1" dirty="0"/>
-          </a:p>
-          <a:p>
-            <a:pPr marL="285750" indent="-285750">
-              <a:buFont typeface="Arial" panose="020B0604020202020204" pitchFamily="34" charset="0"/>
-              <a:buChar char="•"/>
-            </a:pPr>
-            <a:r>
-              <a:rPr lang="en-IE" b="1" u="sng" dirty="0" err="1">
-                <a:solidFill>
-                  <a:srgbClr val="FF0000"/>
-                </a:solidFill>
-              </a:rPr>
-              <a:t>Chatbox</a:t>
-            </a:r>
-            <a:r>
-              <a:rPr lang="en-IE" dirty="0"/>
-              <a:t> – </a:t>
-            </a:r>
-            <a:r>
-              <a:rPr lang="en-IE" i="1" dirty="0"/>
-              <a:t>Getting communication between users in real time</a:t>
-            </a:r>
-          </a:p>
-          <a:p>
-            <a:endParaRPr lang="en-IE" i="1" dirty="0"/>
-          </a:p>
-          <a:p>
-            <a:pPr marL="285750" indent="-285750">
-              <a:buFont typeface="Arial" panose="020B0604020202020204" pitchFamily="34" charset="0"/>
-              <a:buChar char="•"/>
-            </a:pPr>
-            <a:r>
-              <a:rPr lang="en-IE" b="1" u="sng" dirty="0">
-                <a:solidFill>
-                  <a:srgbClr val="FF0000"/>
-                </a:solidFill>
-              </a:rPr>
-              <a:t>Video</a:t>
-            </a:r>
-            <a:r>
-              <a:rPr lang="en-IE" dirty="0"/>
-              <a:t>- allowing users to be able to Video call one another</a:t>
-            </a:r>
-          </a:p>
-          <a:p>
-            <a:endParaRPr lang="en-IE" dirty="0"/>
           </a:p>
         </p:txBody>
       </p:sp>
@@ -7576,8 +8066,8 @@
         </p:nvSpPr>
         <p:spPr>
           <a:xfrm>
-            <a:off x="1162756" y="6050844"/>
-            <a:ext cx="5364545" cy="646331"/>
+            <a:off x="3131765" y="926934"/>
+            <a:ext cx="8236101" cy="800219"/>
           </a:xfrm>
           <a:prstGeom prst="rect">
             <a:avLst/>
@@ -7591,16 +8081,16 @@
           <a:lstStyle/>
           <a:p>
             <a:r>
-              <a:rPr lang="en-IE" dirty="0"/>
+              <a:rPr lang="en-IE" sz="2800" dirty="0"/>
               <a:t>Link to Website:  </a:t>
             </a:r>
             <a:r>
-              <a:rPr lang="en-IE" dirty="0">
+              <a:rPr lang="en-IE" sz="2800" dirty="0">
                 <a:hlinkClick r:id="rId2"/>
               </a:rPr>
               <a:t>http://www.student-mania.com/</a:t>
             </a:r>
-            <a:endParaRPr lang="en-IE" dirty="0"/>
+            <a:endParaRPr lang="en-IE" sz="2800" dirty="0"/>
           </a:p>
           <a:p>
             <a:endParaRPr lang="en-IE" dirty="0"/>
@@ -7609,10 +8099,10 @@
       </p:sp>
       <p:pic>
         <p:nvPicPr>
-          <p:cNvPr id="6" name="Picture 5" descr="Graphical user interface, application&#10;&#10;Description automatically generated">
+          <p:cNvPr id="7" name="Picture 6" descr="Graphical user interface, application&#10;&#10;Description automatically generated">
             <a:extLst>
               <a:ext uri="{FF2B5EF4-FFF2-40B4-BE49-F238E27FC236}">
-                <a16:creationId xmlns:a16="http://schemas.microsoft.com/office/drawing/2014/main" id="{2F90B1FA-BD08-44F2-9BCF-3AD1283839C8}"/>
+                <a16:creationId xmlns:a16="http://schemas.microsoft.com/office/drawing/2014/main" id="{4CFE2D38-2F1E-48CF-9724-9C0D532B61C1}"/>
               </a:ext>
             </a:extLst>
           </p:cNvPr>
@@ -7635,46 +8125,20 @@
         </p:blipFill>
         <p:spPr>
           <a:xfrm>
-            <a:off x="3845028" y="859149"/>
-            <a:ext cx="8154538" cy="2391109"/>
-          </a:xfrm>
-          <a:prstGeom prst="roundRect">
-            <a:avLst>
-              <a:gd name="adj" fmla="val 4167"/>
-            </a:avLst>
+            <a:off x="3076056" y="1671430"/>
+            <a:ext cx="8157753" cy="2028448"/>
+          </a:xfrm>
+          <a:prstGeom prst="rect">
+            <a:avLst/>
           </a:prstGeom>
-          <a:solidFill>
-            <a:srgbClr val="FFFFFF"/>
-          </a:solidFill>
-          <a:ln w="76200" cap="sq">
-            <a:solidFill>
-              <a:srgbClr val="292929"/>
-            </a:solidFill>
-            <a:miter lim="800000"/>
-          </a:ln>
-          <a:effectLst>
-            <a:reflection blurRad="12700" stA="28000" endPos="28000" dist="5000" dir="5400000" sy="-100000" algn="bl" rotWithShape="0"/>
-          </a:effectLst>
-          <a:scene3d>
-            <a:camera prst="orthographicFront"/>
-            <a:lightRig rig="threePt" dir="t">
-              <a:rot lat="0" lon="0" rev="2700000"/>
-            </a:lightRig>
-          </a:scene3d>
-          <a:sp3d>
-            <a:bevelT h="38100"/>
-            <a:contourClr>
-              <a:srgbClr val="C0C0C0"/>
-            </a:contourClr>
-          </a:sp3d>
         </p:spPr>
       </p:pic>
       <p:pic>
         <p:nvPicPr>
-          <p:cNvPr id="8" name="Picture 7" descr="Graphical user interface, application, Teams&#10;&#10;Description automatically generated">
+          <p:cNvPr id="10" name="Picture 9" descr="Graphical user interface, application, Teams&#10;&#10;Description automatically generated">
             <a:extLst>
               <a:ext uri="{FF2B5EF4-FFF2-40B4-BE49-F238E27FC236}">
-                <a16:creationId xmlns:a16="http://schemas.microsoft.com/office/drawing/2014/main" id="{5DAFEB2F-9945-4EC6-880D-055A20F557A2}"/>
+                <a16:creationId xmlns:a16="http://schemas.microsoft.com/office/drawing/2014/main" id="{401FB666-B50F-4B2E-B3E6-F339B6CC0855}"/>
               </a:ext>
             </a:extLst>
           </p:cNvPr>
@@ -7697,40 +8161,85 @@
         </p:blipFill>
         <p:spPr>
           <a:xfrm>
-            <a:off x="3782824" y="3458147"/>
-            <a:ext cx="8154538" cy="2540704"/>
-          </a:xfrm>
-          <a:prstGeom prst="roundRect">
-            <a:avLst>
-              <a:gd name="adj" fmla="val 4167"/>
-            </a:avLst>
+            <a:off x="3076056" y="4172346"/>
+            <a:ext cx="8283401" cy="2139085"/>
+          </a:xfrm>
+          <a:prstGeom prst="rect">
+            <a:avLst/>
           </a:prstGeom>
-          <a:solidFill>
-            <a:srgbClr val="FFFFFF"/>
-          </a:solidFill>
-          <a:ln w="76200" cap="sq">
-            <a:solidFill>
-              <a:srgbClr val="292929"/>
-            </a:solidFill>
-            <a:miter lim="800000"/>
-          </a:ln>
-          <a:effectLst>
-            <a:reflection blurRad="12700" stA="28000" endPos="28000" dist="5000" dir="5400000" sy="-100000" algn="bl" rotWithShape="0"/>
-          </a:effectLst>
-          <a:scene3d>
-            <a:camera prst="orthographicFront"/>
-            <a:lightRig rig="threePt" dir="t">
-              <a:rot lat="0" lon="0" rev="2700000"/>
-            </a:lightRig>
-          </a:scene3d>
-          <a:sp3d>
-            <a:bevelT h="38100"/>
-            <a:contourClr>
-              <a:srgbClr val="C0C0C0"/>
-            </a:contourClr>
-          </a:sp3d>
         </p:spPr>
       </p:pic>
+      <p:sp>
+        <p:nvSpPr>
+          <p:cNvPr id="11" name="TextBox 10">
+            <a:extLst>
+              <a:ext uri="{FF2B5EF4-FFF2-40B4-BE49-F238E27FC236}">
+                <a16:creationId xmlns:a16="http://schemas.microsoft.com/office/drawing/2014/main" id="{3C515557-60C2-4934-BB26-D0516B2B474F}"/>
+              </a:ext>
+            </a:extLst>
+          </p:cNvPr>
+          <p:cNvSpPr txBox="1"/>
+          <p:nvPr/>
+        </p:nvSpPr>
+        <p:spPr>
+          <a:xfrm>
+            <a:off x="958191" y="2265697"/>
+            <a:ext cx="2173574" cy="584775"/>
+          </a:xfrm>
+          <a:prstGeom prst="rect">
+            <a:avLst/>
+          </a:prstGeom>
+          <a:noFill/>
+        </p:spPr>
+        <p:txBody>
+          <a:bodyPr wrap="square" rtlCol="0">
+            <a:spAutoFit/>
+          </a:bodyPr>
+          <a:lstStyle/>
+          <a:p>
+            <a:r>
+              <a:rPr lang="en-GB" sz="3200" dirty="0"/>
+              <a:t>NOW :</a:t>
+            </a:r>
+          </a:p>
+        </p:txBody>
+      </p:sp>
+      <p:sp>
+        <p:nvSpPr>
+          <p:cNvPr id="12" name="TextBox 11">
+            <a:extLst>
+              <a:ext uri="{FF2B5EF4-FFF2-40B4-BE49-F238E27FC236}">
+                <a16:creationId xmlns:a16="http://schemas.microsoft.com/office/drawing/2014/main" id="{8C3C6B7C-AEF0-46BF-8834-C99F96F032AF}"/>
+              </a:ext>
+            </a:extLst>
+          </p:cNvPr>
+          <p:cNvSpPr txBox="1"/>
+          <p:nvPr/>
+        </p:nvSpPr>
+        <p:spPr>
+          <a:xfrm>
+            <a:off x="832543" y="4773136"/>
+            <a:ext cx="1918153" cy="584775"/>
+          </a:xfrm>
+          <a:prstGeom prst="rect">
+            <a:avLst/>
+          </a:prstGeom>
+          <a:noFill/>
+        </p:spPr>
+        <p:txBody>
+          <a:bodyPr wrap="square" rtlCol="0">
+            <a:spAutoFit/>
+          </a:bodyPr>
+          <a:lstStyle/>
+          <a:p>
+            <a:r>
+              <a:rPr lang="en-GB" sz="3200" dirty="0"/>
+              <a:t>GOALS :</a:t>
+            </a:r>
+            <a:endParaRPr lang="en-GB" dirty="0"/>
+          </a:p>
+        </p:txBody>
+      </p:sp>
     </p:spTree>
     <p:extLst>
       <p:ext uri="{BB962C8B-B14F-4D97-AF65-F5344CB8AC3E}">

</xml_diff>